<commit_message>
Rmd complete, pdf generated
</commit_message>
<xml_diff>
--- a/Lab_1.pptx
+++ b/Lab_1.pptx
@@ -9,6 +9,10 @@
     <p:sldId id="257" r:id="rId3"/>
     <p:sldId id="258" r:id="rId4"/>
     <p:sldId id="259" r:id="rId5"/>
+    <p:sldId id="260" r:id="rId6"/>
+    <p:sldId id="263" r:id="rId7"/>
+    <p:sldId id="261" r:id="rId8"/>
+    <p:sldId id="262" r:id="rId9"/>
   </p:sldIdLst>
   <p:sldSz cx="12192000" cy="6858000"/>
   <p:notesSz cx="6858000" cy="9144000"/>
@@ -107,6 +111,11 @@
       </a:defRPr>
     </a:lvl9pPr>
   </p:defaultTextStyle>
+  <p:extLst>
+    <p:ext uri="{EFAFB233-063F-42B5-8137-9DF3F51BA10A}">
+      <p15:sldGuideLst xmlns:p15="http://schemas.microsoft.com/office/powerpoint/2012/main"/>
+    </p:ext>
+  </p:extLst>
 </p:presentation>
 </file>
 
@@ -243,7 +252,7 @@
               <a:rPr lang="en-US" smtClean="0"/>
               <a:t>20-Aug-24</a:t>
             </a:fld>
-            <a:endParaRPr lang="en-US"/>
+            <a:endParaRPr lang="en-US" dirty="0"/>
           </a:p>
         </p:txBody>
       </p:sp>
@@ -262,7 +271,7 @@
           <a:bodyPr/>
           <a:lstStyle/>
           <a:p>
-            <a:endParaRPr lang="en-US"/>
+            <a:endParaRPr lang="en-US" dirty="0"/>
           </a:p>
         </p:txBody>
       </p:sp>
@@ -285,7 +294,7 @@
               <a:rPr lang="en-US" smtClean="0"/>
               <a:t>‹#›</a:t>
             </a:fld>
-            <a:endParaRPr lang="en-US"/>
+            <a:endParaRPr lang="en-US" dirty="0"/>
           </a:p>
         </p:txBody>
       </p:sp>
@@ -413,7 +422,7 @@
               <a:rPr lang="en-US" smtClean="0"/>
               <a:t>20-Aug-24</a:t>
             </a:fld>
-            <a:endParaRPr lang="en-US"/>
+            <a:endParaRPr lang="en-US" dirty="0"/>
           </a:p>
         </p:txBody>
       </p:sp>
@@ -432,7 +441,7 @@
           <a:bodyPr/>
           <a:lstStyle/>
           <a:p>
-            <a:endParaRPr lang="en-US"/>
+            <a:endParaRPr lang="en-US" dirty="0"/>
           </a:p>
         </p:txBody>
       </p:sp>
@@ -455,7 +464,7 @@
               <a:rPr lang="en-US" smtClean="0"/>
               <a:t>‹#›</a:t>
             </a:fld>
-            <a:endParaRPr lang="en-US"/>
+            <a:endParaRPr lang="en-US" dirty="0"/>
           </a:p>
         </p:txBody>
       </p:sp>
@@ -593,7 +602,7 @@
               <a:rPr lang="en-US" smtClean="0"/>
               <a:t>20-Aug-24</a:t>
             </a:fld>
-            <a:endParaRPr lang="en-US"/>
+            <a:endParaRPr lang="en-US" dirty="0"/>
           </a:p>
         </p:txBody>
       </p:sp>
@@ -612,7 +621,7 @@
           <a:bodyPr/>
           <a:lstStyle/>
           <a:p>
-            <a:endParaRPr lang="en-US"/>
+            <a:endParaRPr lang="en-US" dirty="0"/>
           </a:p>
         </p:txBody>
       </p:sp>
@@ -635,7 +644,7 @@
               <a:rPr lang="en-US" smtClean="0"/>
               <a:t>‹#›</a:t>
             </a:fld>
-            <a:endParaRPr lang="en-US"/>
+            <a:endParaRPr lang="en-US" dirty="0"/>
           </a:p>
         </p:txBody>
       </p:sp>
@@ -763,7 +772,7 @@
               <a:rPr lang="en-US" smtClean="0"/>
               <a:t>20-Aug-24</a:t>
             </a:fld>
-            <a:endParaRPr lang="en-US"/>
+            <a:endParaRPr lang="en-US" dirty="0"/>
           </a:p>
         </p:txBody>
       </p:sp>
@@ -782,7 +791,7 @@
           <a:bodyPr/>
           <a:lstStyle/>
           <a:p>
-            <a:endParaRPr lang="en-US"/>
+            <a:endParaRPr lang="en-US" dirty="0"/>
           </a:p>
         </p:txBody>
       </p:sp>
@@ -805,7 +814,7 @@
               <a:rPr lang="en-US" smtClean="0"/>
               <a:t>‹#›</a:t>
             </a:fld>
-            <a:endParaRPr lang="en-US"/>
+            <a:endParaRPr lang="en-US" dirty="0"/>
           </a:p>
         </p:txBody>
       </p:sp>
@@ -1009,7 +1018,7 @@
               <a:rPr lang="en-US" smtClean="0"/>
               <a:t>20-Aug-24</a:t>
             </a:fld>
-            <a:endParaRPr lang="en-US"/>
+            <a:endParaRPr lang="en-US" dirty="0"/>
           </a:p>
         </p:txBody>
       </p:sp>
@@ -1028,7 +1037,7 @@
           <a:bodyPr/>
           <a:lstStyle/>
           <a:p>
-            <a:endParaRPr lang="en-US"/>
+            <a:endParaRPr lang="en-US" dirty="0"/>
           </a:p>
         </p:txBody>
       </p:sp>
@@ -1051,7 +1060,7 @@
               <a:rPr lang="en-US" smtClean="0"/>
               <a:t>‹#›</a:t>
             </a:fld>
-            <a:endParaRPr lang="en-US"/>
+            <a:endParaRPr lang="en-US" dirty="0"/>
           </a:p>
         </p:txBody>
       </p:sp>
@@ -1241,7 +1250,7 @@
               <a:rPr lang="en-US" smtClean="0"/>
               <a:t>20-Aug-24</a:t>
             </a:fld>
-            <a:endParaRPr lang="en-US"/>
+            <a:endParaRPr lang="en-US" dirty="0"/>
           </a:p>
         </p:txBody>
       </p:sp>
@@ -1260,7 +1269,7 @@
           <a:bodyPr/>
           <a:lstStyle/>
           <a:p>
-            <a:endParaRPr lang="en-US"/>
+            <a:endParaRPr lang="en-US" dirty="0"/>
           </a:p>
         </p:txBody>
       </p:sp>
@@ -1283,7 +1292,7 @@
               <a:rPr lang="en-US" smtClean="0"/>
               <a:t>‹#›</a:t>
             </a:fld>
-            <a:endParaRPr lang="en-US"/>
+            <a:endParaRPr lang="en-US" dirty="0"/>
           </a:p>
         </p:txBody>
       </p:sp>
@@ -1608,7 +1617,7 @@
               <a:rPr lang="en-US" smtClean="0"/>
               <a:t>20-Aug-24</a:t>
             </a:fld>
-            <a:endParaRPr lang="en-US"/>
+            <a:endParaRPr lang="en-US" dirty="0"/>
           </a:p>
         </p:txBody>
       </p:sp>
@@ -1627,7 +1636,7 @@
           <a:bodyPr/>
           <a:lstStyle/>
           <a:p>
-            <a:endParaRPr lang="en-US"/>
+            <a:endParaRPr lang="en-US" dirty="0"/>
           </a:p>
         </p:txBody>
       </p:sp>
@@ -1650,7 +1659,7 @@
               <a:rPr lang="en-US" smtClean="0"/>
               <a:t>‹#›</a:t>
             </a:fld>
-            <a:endParaRPr lang="en-US"/>
+            <a:endParaRPr lang="en-US" dirty="0"/>
           </a:p>
         </p:txBody>
       </p:sp>
@@ -1726,7 +1735,7 @@
               <a:rPr lang="en-US" smtClean="0"/>
               <a:t>20-Aug-24</a:t>
             </a:fld>
-            <a:endParaRPr lang="en-US"/>
+            <a:endParaRPr lang="en-US" dirty="0"/>
           </a:p>
         </p:txBody>
       </p:sp>
@@ -1745,7 +1754,7 @@
           <a:bodyPr/>
           <a:lstStyle/>
           <a:p>
-            <a:endParaRPr lang="en-US"/>
+            <a:endParaRPr lang="en-US" dirty="0"/>
           </a:p>
         </p:txBody>
       </p:sp>
@@ -1768,7 +1777,7 @@
               <a:rPr lang="en-US" smtClean="0"/>
               <a:t>‹#›</a:t>
             </a:fld>
-            <a:endParaRPr lang="en-US"/>
+            <a:endParaRPr lang="en-US" dirty="0"/>
           </a:p>
         </p:txBody>
       </p:sp>
@@ -1821,7 +1830,7 @@
               <a:rPr lang="en-US" smtClean="0"/>
               <a:t>20-Aug-24</a:t>
             </a:fld>
-            <a:endParaRPr lang="en-US"/>
+            <a:endParaRPr lang="en-US" dirty="0"/>
           </a:p>
         </p:txBody>
       </p:sp>
@@ -1840,7 +1849,7 @@
           <a:bodyPr/>
           <a:lstStyle/>
           <a:p>
-            <a:endParaRPr lang="en-US"/>
+            <a:endParaRPr lang="en-US" dirty="0"/>
           </a:p>
         </p:txBody>
       </p:sp>
@@ -1863,7 +1872,7 @@
               <a:rPr lang="en-US" smtClean="0"/>
               <a:t>‹#›</a:t>
             </a:fld>
-            <a:endParaRPr lang="en-US"/>
+            <a:endParaRPr lang="en-US" dirty="0"/>
           </a:p>
         </p:txBody>
       </p:sp>
@@ -2098,7 +2107,7 @@
               <a:rPr lang="en-US" smtClean="0"/>
               <a:t>20-Aug-24</a:t>
             </a:fld>
-            <a:endParaRPr lang="en-US"/>
+            <a:endParaRPr lang="en-US" dirty="0"/>
           </a:p>
         </p:txBody>
       </p:sp>
@@ -2117,7 +2126,7 @@
           <a:bodyPr/>
           <a:lstStyle/>
           <a:p>
-            <a:endParaRPr lang="en-US"/>
+            <a:endParaRPr lang="en-US" dirty="0"/>
           </a:p>
         </p:txBody>
       </p:sp>
@@ -2140,7 +2149,7 @@
               <a:rPr lang="en-US" smtClean="0"/>
               <a:t>‹#›</a:t>
             </a:fld>
-            <a:endParaRPr lang="en-US"/>
+            <a:endParaRPr lang="en-US" dirty="0"/>
           </a:p>
         </p:txBody>
       </p:sp>
@@ -2263,7 +2272,7 @@
             </a:lvl9pPr>
           </a:lstStyle>
           <a:p>
-            <a:endParaRPr lang="en-US"/>
+            <a:endParaRPr lang="en-US" dirty="0"/>
           </a:p>
         </p:txBody>
       </p:sp>
@@ -2351,7 +2360,7 @@
               <a:rPr lang="en-US" smtClean="0"/>
               <a:t>20-Aug-24</a:t>
             </a:fld>
-            <a:endParaRPr lang="en-US"/>
+            <a:endParaRPr lang="en-US" dirty="0"/>
           </a:p>
         </p:txBody>
       </p:sp>
@@ -2370,7 +2379,7 @@
           <a:bodyPr/>
           <a:lstStyle/>
           <a:p>
-            <a:endParaRPr lang="en-US"/>
+            <a:endParaRPr lang="en-US" dirty="0"/>
           </a:p>
         </p:txBody>
       </p:sp>
@@ -2393,7 +2402,7 @@
               <a:rPr lang="en-US" smtClean="0"/>
               <a:t>‹#›</a:t>
             </a:fld>
-            <a:endParaRPr lang="en-US"/>
+            <a:endParaRPr lang="en-US" dirty="0"/>
           </a:p>
         </p:txBody>
       </p:sp>
@@ -2564,7 +2573,7 @@
               <a:rPr lang="en-US" smtClean="0"/>
               <a:t>20-Aug-24</a:t>
             </a:fld>
-            <a:endParaRPr lang="en-US"/>
+            <a:endParaRPr lang="en-US" dirty="0"/>
           </a:p>
         </p:txBody>
       </p:sp>
@@ -2601,7 +2610,7 @@
             </a:lvl1pPr>
           </a:lstStyle>
           <a:p>
-            <a:endParaRPr lang="en-US"/>
+            <a:endParaRPr lang="en-US" dirty="0"/>
           </a:p>
         </p:txBody>
       </p:sp>
@@ -2642,7 +2651,7 @@
               <a:rPr lang="en-US" smtClean="0"/>
               <a:t>‹#›</a:t>
             </a:fld>
-            <a:endParaRPr lang="en-US"/>
+            <a:endParaRPr lang="en-US" dirty="0"/>
           </a:p>
         </p:txBody>
       </p:sp>
@@ -3244,7 +3253,11 @@
           <a:bodyPr/>
           <a:lstStyle/>
           <a:p>
-            <a:endParaRPr lang="en-US"/>
+            <a:r>
+              <a:rPr lang="en-US" dirty="0" smtClean="0"/>
+              <a:t>Open interest V/S volume</a:t>
+            </a:r>
+            <a:endParaRPr lang="en-US" dirty="0"/>
           </a:p>
         </p:txBody>
       </p:sp>
@@ -3271,6 +3284,362 @@
     <p:extLst>
       <p:ext uri="{BB962C8B-B14F-4D97-AF65-F5344CB8AC3E}">
         <p14:creationId xmlns:p14="http://schemas.microsoft.com/office/powerpoint/2010/main" val="3043109650"/>
+      </p:ext>
+    </p:extLst>
+  </p:cSld>
+  <p:clrMapOvr>
+    <a:masterClrMapping/>
+  </p:clrMapOvr>
+</p:sld>
+</file>
+
+<file path=ppt/slides/slide5.xml><?xml version="1.0" encoding="utf-8"?>
+<p:sld xmlns:a="http://schemas.openxmlformats.org/drawingml/2006/main" xmlns:r="http://schemas.openxmlformats.org/officeDocument/2006/relationships" xmlns:p="http://schemas.openxmlformats.org/presentationml/2006/main">
+  <p:cSld>
+    <p:spTree>
+      <p:nvGrpSpPr>
+        <p:cNvPr id="1" name=""/>
+        <p:cNvGrpSpPr/>
+        <p:nvPr/>
+      </p:nvGrpSpPr>
+      <p:grpSpPr>
+        <a:xfrm>
+          <a:off x="0" y="0"/>
+          <a:ext cx="0" cy="0"/>
+          <a:chOff x="0" y="0"/>
+          <a:chExt cx="0" cy="0"/>
+        </a:xfrm>
+      </p:grpSpPr>
+      <p:sp>
+        <p:nvSpPr>
+          <p:cNvPr id="2" name="Title 1"/>
+          <p:cNvSpPr>
+            <a:spLocks noGrp="1"/>
+          </p:cNvSpPr>
+          <p:nvPr>
+            <p:ph type="title"/>
+          </p:nvPr>
+        </p:nvSpPr>
+        <p:spPr/>
+        <p:txBody>
+          <a:bodyPr/>
+          <a:lstStyle/>
+          <a:p>
+            <a:r>
+              <a:rPr lang="en-US" dirty="0" smtClean="0"/>
+              <a:t>Read data into R</a:t>
+            </a:r>
+            <a:endParaRPr lang="en-US" dirty="0"/>
+          </a:p>
+        </p:txBody>
+      </p:sp>
+      <p:sp>
+        <p:nvSpPr>
+          <p:cNvPr id="3" name="Content Placeholder 2"/>
+          <p:cNvSpPr>
+            <a:spLocks noGrp="1"/>
+          </p:cNvSpPr>
+          <p:nvPr>
+            <p:ph idx="1"/>
+          </p:nvPr>
+        </p:nvSpPr>
+        <p:spPr/>
+        <p:txBody>
+          <a:bodyPr/>
+          <a:lstStyle/>
+          <a:p>
+            <a:r>
+              <a:rPr lang="en-US" dirty="0" err="1" smtClean="0"/>
+              <a:t>read_csv</a:t>
+            </a:r>
+            <a:r>
+              <a:rPr lang="en-US" dirty="0" smtClean="0"/>
+              <a:t>(“file_name.csv”)</a:t>
+            </a:r>
+          </a:p>
+          <a:p>
+            <a:r>
+              <a:rPr lang="en-US" dirty="0" err="1"/>
+              <a:t>r</a:t>
+            </a:r>
+            <a:r>
+              <a:rPr lang="en-US" dirty="0" err="1" smtClean="0"/>
+              <a:t>ead_excel</a:t>
+            </a:r>
+            <a:r>
+              <a:rPr lang="en-US" dirty="0" smtClean="0"/>
+              <a:t>(here(“</a:t>
+            </a:r>
+            <a:r>
+              <a:rPr lang="en-US" dirty="0" err="1" smtClean="0"/>
+              <a:t>folder_name",“data.xlsx</a:t>
+            </a:r>
+            <a:r>
+              <a:rPr lang="en-US" dirty="0" smtClean="0"/>
+              <a:t>"),</a:t>
+            </a:r>
+          </a:p>
+          <a:p>
+            <a:pPr marL="0" indent="0">
+              <a:buNone/>
+            </a:pPr>
+            <a:r>
+              <a:rPr lang="en-US" dirty="0" smtClean="0"/>
+              <a:t>				sheet=“</a:t>
+            </a:r>
+            <a:r>
+              <a:rPr lang="en-US" dirty="0" err="1" smtClean="0"/>
+              <a:t>sheet_name</a:t>
+            </a:r>
+            <a:r>
+              <a:rPr lang="en-US" dirty="0" smtClean="0"/>
+              <a:t>")</a:t>
+            </a:r>
+          </a:p>
+          <a:p>
+            <a:r>
+              <a:rPr lang="en-US" dirty="0" err="1"/>
+              <a:t>readRDS</a:t>
+            </a:r>
+            <a:r>
+              <a:rPr lang="en-US" dirty="0"/>
+              <a:t>(here</a:t>
+            </a:r>
+            <a:r>
+              <a:rPr lang="en-US" dirty="0" smtClean="0"/>
+              <a:t>(“folder_name",“</a:t>
+            </a:r>
+            <a:r>
+              <a:rPr lang="en-US" dirty="0" err="1" smtClean="0"/>
+              <a:t>file_name.RDS</a:t>
+            </a:r>
+            <a:r>
+              <a:rPr lang="en-US" dirty="0"/>
+              <a:t>"))</a:t>
+            </a:r>
+          </a:p>
+        </p:txBody>
+      </p:sp>
+    </p:spTree>
+    <p:extLst>
+      <p:ext uri="{BB962C8B-B14F-4D97-AF65-F5344CB8AC3E}">
+        <p14:creationId xmlns:p14="http://schemas.microsoft.com/office/powerpoint/2010/main" val="2325271455"/>
+      </p:ext>
+    </p:extLst>
+  </p:cSld>
+  <p:clrMapOvr>
+    <a:masterClrMapping/>
+  </p:clrMapOvr>
+</p:sld>
+</file>
+
+<file path=ppt/slides/slide6.xml><?xml version="1.0" encoding="utf-8"?>
+<p:sld xmlns:a="http://schemas.openxmlformats.org/drawingml/2006/main" xmlns:r="http://schemas.openxmlformats.org/officeDocument/2006/relationships" xmlns:p="http://schemas.openxmlformats.org/presentationml/2006/main">
+  <p:cSld>
+    <p:spTree>
+      <p:nvGrpSpPr>
+        <p:cNvPr id="1" name=""/>
+        <p:cNvGrpSpPr/>
+        <p:nvPr/>
+      </p:nvGrpSpPr>
+      <p:grpSpPr>
+        <a:xfrm>
+          <a:off x="0" y="0"/>
+          <a:ext cx="0" cy="0"/>
+          <a:chOff x="0" y="0"/>
+          <a:chExt cx="0" cy="0"/>
+        </a:xfrm>
+      </p:grpSpPr>
+      <p:sp>
+        <p:nvSpPr>
+          <p:cNvPr id="2" name="Title 1"/>
+          <p:cNvSpPr>
+            <a:spLocks noGrp="1"/>
+          </p:cNvSpPr>
+          <p:nvPr>
+            <p:ph type="title"/>
+          </p:nvPr>
+        </p:nvSpPr>
+        <p:spPr/>
+        <p:txBody>
+          <a:bodyPr/>
+          <a:lstStyle/>
+          <a:p>
+            <a:r>
+              <a:rPr lang="en-US" dirty="0" smtClean="0"/>
+              <a:t>Plot using GGPLOT library</a:t>
+            </a:r>
+            <a:endParaRPr lang="en-US" dirty="0"/>
+          </a:p>
+        </p:txBody>
+      </p:sp>
+      <p:sp>
+        <p:nvSpPr>
+          <p:cNvPr id="3" name="Content Placeholder 2"/>
+          <p:cNvSpPr>
+            <a:spLocks noGrp="1"/>
+          </p:cNvSpPr>
+          <p:nvPr>
+            <p:ph idx="1"/>
+          </p:nvPr>
+        </p:nvSpPr>
+        <p:spPr/>
+        <p:txBody>
+          <a:bodyPr/>
+          <a:lstStyle/>
+          <a:p>
+            <a:endParaRPr lang="en-US"/>
+          </a:p>
+        </p:txBody>
+      </p:sp>
+    </p:spTree>
+    <p:extLst>
+      <p:ext uri="{BB962C8B-B14F-4D97-AF65-F5344CB8AC3E}">
+        <p14:creationId xmlns:p14="http://schemas.microsoft.com/office/powerpoint/2010/main" val="791643786"/>
+      </p:ext>
+    </p:extLst>
+  </p:cSld>
+  <p:clrMapOvr>
+    <a:masterClrMapping/>
+  </p:clrMapOvr>
+</p:sld>
+</file>
+
+<file path=ppt/slides/slide7.xml><?xml version="1.0" encoding="utf-8"?>
+<p:sld xmlns:a="http://schemas.openxmlformats.org/drawingml/2006/main" xmlns:r="http://schemas.openxmlformats.org/officeDocument/2006/relationships" xmlns:p="http://schemas.openxmlformats.org/presentationml/2006/main">
+  <p:cSld>
+    <p:spTree>
+      <p:nvGrpSpPr>
+        <p:cNvPr id="1" name=""/>
+        <p:cNvGrpSpPr/>
+        <p:nvPr/>
+      </p:nvGrpSpPr>
+      <p:grpSpPr>
+        <a:xfrm>
+          <a:off x="0" y="0"/>
+          <a:ext cx="0" cy="0"/>
+          <a:chOff x="0" y="0"/>
+          <a:chExt cx="0" cy="0"/>
+        </a:xfrm>
+      </p:grpSpPr>
+      <p:sp>
+        <p:nvSpPr>
+          <p:cNvPr id="2" name="Title 1"/>
+          <p:cNvSpPr>
+            <a:spLocks noGrp="1"/>
+          </p:cNvSpPr>
+          <p:nvPr>
+            <p:ph type="title"/>
+          </p:nvPr>
+        </p:nvSpPr>
+        <p:spPr/>
+        <p:txBody>
+          <a:bodyPr/>
+          <a:lstStyle/>
+          <a:p>
+            <a:r>
+              <a:rPr lang="en-US" dirty="0" smtClean="0"/>
+              <a:t>Regression using dummies</a:t>
+            </a:r>
+            <a:endParaRPr lang="en-US" dirty="0"/>
+          </a:p>
+        </p:txBody>
+      </p:sp>
+      <p:sp>
+        <p:nvSpPr>
+          <p:cNvPr id="3" name="Content Placeholder 2"/>
+          <p:cNvSpPr>
+            <a:spLocks noGrp="1"/>
+          </p:cNvSpPr>
+          <p:nvPr>
+            <p:ph idx="1"/>
+          </p:nvPr>
+        </p:nvSpPr>
+        <p:spPr/>
+        <p:txBody>
+          <a:bodyPr/>
+          <a:lstStyle/>
+          <a:p>
+            <a:endParaRPr lang="en-US"/>
+          </a:p>
+        </p:txBody>
+      </p:sp>
+    </p:spTree>
+    <p:extLst>
+      <p:ext uri="{BB962C8B-B14F-4D97-AF65-F5344CB8AC3E}">
+        <p14:creationId xmlns:p14="http://schemas.microsoft.com/office/powerpoint/2010/main" val="2010920063"/>
+      </p:ext>
+    </p:extLst>
+  </p:cSld>
+  <p:clrMapOvr>
+    <a:masterClrMapping/>
+  </p:clrMapOvr>
+</p:sld>
+</file>
+
+<file path=ppt/slides/slide8.xml><?xml version="1.0" encoding="utf-8"?>
+<p:sld xmlns:a="http://schemas.openxmlformats.org/drawingml/2006/main" xmlns:r="http://schemas.openxmlformats.org/officeDocument/2006/relationships" xmlns:p="http://schemas.openxmlformats.org/presentationml/2006/main">
+  <p:cSld>
+    <p:spTree>
+      <p:nvGrpSpPr>
+        <p:cNvPr id="1" name=""/>
+        <p:cNvGrpSpPr/>
+        <p:nvPr/>
+      </p:nvGrpSpPr>
+      <p:grpSpPr>
+        <a:xfrm>
+          <a:off x="0" y="0"/>
+          <a:ext cx="0" cy="0"/>
+          <a:chOff x="0" y="0"/>
+          <a:chExt cx="0" cy="0"/>
+        </a:xfrm>
+      </p:grpSpPr>
+      <p:sp>
+        <p:nvSpPr>
+          <p:cNvPr id="2" name="Title 1"/>
+          <p:cNvSpPr>
+            <a:spLocks noGrp="1"/>
+          </p:cNvSpPr>
+          <p:nvPr>
+            <p:ph type="title"/>
+          </p:nvPr>
+        </p:nvSpPr>
+        <p:spPr/>
+        <p:txBody>
+          <a:bodyPr/>
+          <a:lstStyle/>
+          <a:p>
+            <a:r>
+              <a:rPr lang="en-US" dirty="0" smtClean="0"/>
+              <a:t>Stargazer package</a:t>
+            </a:r>
+            <a:endParaRPr lang="en-US" dirty="0"/>
+          </a:p>
+        </p:txBody>
+      </p:sp>
+      <p:sp>
+        <p:nvSpPr>
+          <p:cNvPr id="3" name="Content Placeholder 2"/>
+          <p:cNvSpPr>
+            <a:spLocks noGrp="1"/>
+          </p:cNvSpPr>
+          <p:nvPr>
+            <p:ph idx="1"/>
+          </p:nvPr>
+        </p:nvSpPr>
+        <p:spPr/>
+        <p:txBody>
+          <a:bodyPr/>
+          <a:lstStyle/>
+          <a:p>
+            <a:endParaRPr lang="en-US" dirty="0"/>
+          </a:p>
+        </p:txBody>
+      </p:sp>
+    </p:spTree>
+    <p:extLst>
+      <p:ext uri="{BB962C8B-B14F-4D97-AF65-F5344CB8AC3E}">
+        <p14:creationId xmlns:p14="http://schemas.microsoft.com/office/powerpoint/2010/main" val="2975666497"/>
       </p:ext>
     </p:extLst>
   </p:cSld>

</xml_diff>